<commit_message>
Repository search page for Gibson Assembly HTML
repo.html - HTML module that will allow the user to look at the Recombinase Gibson Assembly's image repository or search a 
particular tag within the image repository. When complete, it will dynamically be able to store each tagged image's link (via memoization) in a MongoDB database backend. 

Also, the new version of the DAMPLAB / WETLAB presentation uploaded as well (significantly shorter and sweeter) 
#KISS (Keep It Short, Simple, (and Sweet))
</commit_message>
<xml_diff>
--- a/meeting2-jason.pptx
+++ b/meeting2-jason.pptx
@@ -5,18 +5,19 @@
     <p:sldMasterId id="2147483648" r:id="rId1"/>
   </p:sldMasterIdLst>
   <p:notesMasterIdLst>
-    <p:notesMasterId r:id="rId11"/>
+    <p:notesMasterId r:id="rId12"/>
   </p:notesMasterIdLst>
   <p:sldIdLst>
     <p:sldId id="256" r:id="rId2"/>
-    <p:sldId id="262" r:id="rId3"/>
-    <p:sldId id="257" r:id="rId4"/>
-    <p:sldId id="258" r:id="rId5"/>
-    <p:sldId id="259" r:id="rId6"/>
-    <p:sldId id="260" r:id="rId7"/>
-    <p:sldId id="261" r:id="rId8"/>
-    <p:sldId id="263" r:id="rId9"/>
-    <p:sldId id="264" r:id="rId10"/>
+    <p:sldId id="257" r:id="rId3"/>
+    <p:sldId id="259" r:id="rId4"/>
+    <p:sldId id="260" r:id="rId5"/>
+    <p:sldId id="261" r:id="rId6"/>
+    <p:sldId id="264" r:id="rId7"/>
+    <p:sldId id="267" r:id="rId8"/>
+    <p:sldId id="273" r:id="rId9"/>
+    <p:sldId id="274" r:id="rId10"/>
+    <p:sldId id="278" r:id="rId11"/>
   </p:sldIdLst>
   <p:sldSz cx="12192000" cy="6858000"/>
   <p:notesSz cx="6858000" cy="9144000"/>
@@ -205,7 +206,7 @@
           <a:p>
             <a:fld id="{E5C61326-168F-194E-836A-62CE6444E578}" type="datetimeFigureOut">
               <a:rPr lang="en-US" smtClean="0"/>
-              <a:t>6/26/17</a:t>
+              <a:t>7/11/17</a:t>
             </a:fld>
             <a:endParaRPr lang="en-US"/>
           </a:p>
@@ -525,6 +526,25 @@
               <a:rPr lang="en-US" baseline="0" dirty="0" smtClean="0"/>
               <a:t> Meeting 2 (July TBD 2017) </a:t>
             </a:r>
+          </a:p>
+          <a:p>
+            <a:endParaRPr lang="en-US" baseline="0" dirty="0" smtClean="0"/>
+          </a:p>
+          <a:p>
+            <a:r>
+              <a:rPr lang="en-US" baseline="0" dirty="0" smtClean="0"/>
+              <a:t>Revise the slides according to Rohin’s Request / Mary’s Suggestion (add in a flowchart) </a:t>
+            </a:r>
+            <a:endParaRPr lang="en-US" baseline="0" dirty="0" smtClean="0"/>
+          </a:p>
+          <a:p>
+            <a:endParaRPr lang="en-US" baseline="0" dirty="0" smtClean="0"/>
+          </a:p>
+          <a:p>
+            <a:r>
+              <a:rPr lang="en-US" baseline="0" dirty="0" smtClean="0"/>
+              <a:t>Reduced to total of just 11 slides</a:t>
+            </a:r>
             <a:endParaRPr lang="en-US" dirty="0"/>
           </a:p>
         </p:txBody>
@@ -609,14 +629,6 @@
           <a:bodyPr/>
           <a:lstStyle/>
           <a:p>
-            <a:r>
-              <a:rPr lang="en-US" dirty="0" smtClean="0"/>
-              <a:t>Hint: cut</a:t>
-            </a:r>
-            <a:r>
-              <a:rPr lang="en-US" baseline="0" dirty="0" smtClean="0"/>
-              <a:t> it to the chase! </a:t>
-            </a:r>
             <a:endParaRPr lang="en-US" dirty="0"/>
           </a:p>
         </p:txBody>
@@ -647,7 +659,7 @@
     </p:spTree>
     <p:extLst>
       <p:ext uri="{BB962C8B-B14F-4D97-AF65-F5344CB8AC3E}">
-        <p14:creationId xmlns:p14="http://schemas.microsoft.com/office/powerpoint/2010/main" val="2146410762"/>
+        <p14:creationId xmlns:p14="http://schemas.microsoft.com/office/powerpoint/2010/main" val="861746410"/>
       </p:ext>
     </p:extLst>
   </p:cSld>
@@ -703,39 +715,15 @@
           <a:p>
             <a:r>
               <a:rPr lang="en-US" dirty="0" smtClean="0"/>
-              <a:t>Note: explain</a:t>
+              <a:t>Note: best explain all of the codes in non-CS terms (though </a:t>
+            </a:r>
+            <a:r>
+              <a:rPr lang="en-US" dirty="0" err="1" smtClean="0"/>
+              <a:t>Densmore</a:t>
             </a:r>
             <a:r>
               <a:rPr lang="en-US" baseline="0" dirty="0" smtClean="0"/>
-              <a:t> the concept of abstraction with non-CS terms </a:t>
-            </a:r>
-          </a:p>
-          <a:p>
-            <a:r>
-              <a:rPr lang="en-US" baseline="0" dirty="0" smtClean="0"/>
-              <a:t>Maybe take out </a:t>
-            </a:r>
-            <a:r>
-              <a:rPr lang="en-US" baseline="0" dirty="0" err="1" smtClean="0"/>
-              <a:t>localhost</a:t>
-            </a:r>
-            <a:r>
-              <a:rPr lang="en-US" baseline="0" dirty="0" smtClean="0"/>
-              <a:t> concept (just say it can be run without a browser) </a:t>
-            </a:r>
-          </a:p>
-          <a:p>
-            <a:r>
-              <a:rPr lang="en-US" baseline="0" dirty="0" smtClean="0"/>
-              <a:t>Example: the BU 802.1 network that times out almost </a:t>
-            </a:r>
-            <a:r>
-              <a:rPr lang="en-US" baseline="0" dirty="0" err="1" smtClean="0"/>
-              <a:t>periodicially</a:t>
-            </a:r>
-            <a:r>
-              <a:rPr lang="en-US" baseline="0" dirty="0" smtClean="0"/>
-              <a:t> </a:t>
+              <a:t> might know quite a bit of them) </a:t>
             </a:r>
             <a:endParaRPr lang="en-US" dirty="0"/>
           </a:p>
@@ -758,7 +746,7 @@
           <a:p>
             <a:fld id="{9B710283-B237-EB4E-87BF-EFBE51A0E926}" type="slidenum">
               <a:rPr lang="en-US" smtClean="0"/>
-              <a:t>6</a:t>
+              <a:t>5</a:t>
             </a:fld>
             <a:endParaRPr lang="en-US"/>
           </a:p>
@@ -767,7 +755,7 @@
     </p:spTree>
     <p:extLst>
       <p:ext uri="{BB962C8B-B14F-4D97-AF65-F5344CB8AC3E}">
-        <p14:creationId xmlns:p14="http://schemas.microsoft.com/office/powerpoint/2010/main" val="861746410"/>
+        <p14:creationId xmlns:p14="http://schemas.microsoft.com/office/powerpoint/2010/main" val="2063449294"/>
       </p:ext>
     </p:extLst>
   </p:cSld>
@@ -823,15 +811,11 @@
           <a:p>
             <a:r>
               <a:rPr lang="en-US" dirty="0" smtClean="0"/>
-              <a:t>Note: best explain all of the codes in non-CS terms (though </a:t>
-            </a:r>
-            <a:r>
-              <a:rPr lang="en-US" dirty="0" err="1" smtClean="0"/>
-              <a:t>Densmore</a:t>
+              <a:t>Demo</a:t>
             </a:r>
             <a:r>
               <a:rPr lang="en-US" baseline="0" dirty="0" smtClean="0"/>
-              <a:t> might know quite a bit of them) </a:t>
+              <a:t> the site and the flowchart </a:t>
             </a:r>
             <a:endParaRPr lang="en-US" dirty="0"/>
           </a:p>
@@ -863,7 +847,109 @@
     </p:spTree>
     <p:extLst>
       <p:ext uri="{BB962C8B-B14F-4D97-AF65-F5344CB8AC3E}">
-        <p14:creationId xmlns:p14="http://schemas.microsoft.com/office/powerpoint/2010/main" val="2063449294"/>
+        <p14:creationId xmlns:p14="http://schemas.microsoft.com/office/powerpoint/2010/main" val="1065103348"/>
+      </p:ext>
+    </p:extLst>
+  </p:cSld>
+  <p:clrMapOvr>
+    <a:masterClrMapping/>
+  </p:clrMapOvr>
+</p:notes>
+</file>
+
+<file path=ppt/notesSlides/notesSlide5.xml><?xml version="1.0" encoding="utf-8"?>
+<p:notes xmlns:a="http://schemas.openxmlformats.org/drawingml/2006/main" xmlns:r="http://schemas.openxmlformats.org/officeDocument/2006/relationships" xmlns:p="http://schemas.openxmlformats.org/presentationml/2006/main">
+  <p:cSld>
+    <p:spTree>
+      <p:nvGrpSpPr>
+        <p:cNvPr id="1" name=""/>
+        <p:cNvGrpSpPr/>
+        <p:nvPr/>
+      </p:nvGrpSpPr>
+      <p:grpSpPr>
+        <a:xfrm>
+          <a:off x="0" y="0"/>
+          <a:ext cx="0" cy="0"/>
+          <a:chOff x="0" y="0"/>
+          <a:chExt cx="0" cy="0"/>
+        </a:xfrm>
+      </p:grpSpPr>
+      <p:sp>
+        <p:nvSpPr>
+          <p:cNvPr id="2" name="Slide Image Placeholder 1"/>
+          <p:cNvSpPr>
+            <a:spLocks noGrp="1" noRot="1" noChangeAspect="1"/>
+          </p:cNvSpPr>
+          <p:nvPr>
+            <p:ph type="sldImg"/>
+          </p:nvPr>
+        </p:nvSpPr>
+        <p:spPr/>
+      </p:sp>
+      <p:sp>
+        <p:nvSpPr>
+          <p:cNvPr id="3" name="Notes Placeholder 2"/>
+          <p:cNvSpPr>
+            <a:spLocks noGrp="1"/>
+          </p:cNvSpPr>
+          <p:nvPr>
+            <p:ph type="body" idx="1"/>
+          </p:nvPr>
+        </p:nvSpPr>
+        <p:spPr/>
+        <p:txBody>
+          <a:bodyPr/>
+          <a:lstStyle/>
+          <a:p>
+            <a:r>
+              <a:rPr lang="en-US" dirty="0" smtClean="0"/>
+              <a:t>Explain what the Steve</a:t>
+            </a:r>
+            <a:r>
+              <a:rPr lang="en-US" baseline="0" dirty="0" smtClean="0"/>
+              <a:t> Jobs quote means in terms of our Gibson Assembly Conversion project (especially to that of how to make Rohin’s job easier while using my computing skills to make it happen) </a:t>
+            </a:r>
+            <a:endParaRPr lang="en-US" baseline="0" dirty="0" smtClean="0"/>
+          </a:p>
+          <a:p>
+            <a:endParaRPr lang="en-US" baseline="0" dirty="0" smtClean="0"/>
+          </a:p>
+          <a:p>
+            <a:r>
+              <a:rPr lang="en-US" baseline="0" dirty="0" smtClean="0"/>
+              <a:t>Also explain why this project is different than what is already available in the CIDAR LAB </a:t>
+            </a:r>
+            <a:endParaRPr lang="en-US" dirty="0"/>
+          </a:p>
+        </p:txBody>
+      </p:sp>
+      <p:sp>
+        <p:nvSpPr>
+          <p:cNvPr id="4" name="Slide Number Placeholder 3"/>
+          <p:cNvSpPr>
+            <a:spLocks noGrp="1"/>
+          </p:cNvSpPr>
+          <p:nvPr>
+            <p:ph type="sldNum" sz="quarter" idx="10"/>
+          </p:nvPr>
+        </p:nvSpPr>
+        <p:spPr/>
+        <p:txBody>
+          <a:bodyPr/>
+          <a:lstStyle/>
+          <a:p>
+            <a:fld id="{9B710283-B237-EB4E-87BF-EFBE51A0E926}" type="slidenum">
+              <a:rPr lang="en-US" smtClean="0"/>
+              <a:t>9</a:t>
+            </a:fld>
+            <a:endParaRPr lang="en-US"/>
+          </a:p>
+        </p:txBody>
+      </p:sp>
+    </p:spTree>
+    <p:extLst>
+      <p:ext uri="{BB962C8B-B14F-4D97-AF65-F5344CB8AC3E}">
+        <p14:creationId xmlns:p14="http://schemas.microsoft.com/office/powerpoint/2010/main" val="714880226"/>
       </p:ext>
     </p:extLst>
   </p:cSld>
@@ -1043,7 +1129,7 @@
           <a:p>
             <a:fld id="{48A87A34-81AB-432B-8DAE-1953F412C126}" type="datetimeFigureOut">
               <a:rPr lang="en-US" dirty="0"/>
-              <a:t>6/26/17</a:t>
+              <a:t>7/11/17</a:t>
             </a:fld>
             <a:endParaRPr lang="en-US" dirty="0"/>
           </a:p>
@@ -1305,7 +1391,7 @@
           <a:p>
             <a:fld id="{48A87A34-81AB-432B-8DAE-1953F412C126}" type="datetimeFigureOut">
               <a:rPr lang="en-US" dirty="0"/>
-              <a:t>6/26/17</a:t>
+              <a:t>7/11/17</a:t>
             </a:fld>
             <a:endParaRPr lang="en-US" dirty="0"/>
           </a:p>
@@ -1532,7 +1618,7 @@
             <a:fld id="{48A87A34-81AB-432B-8DAE-1953F412C126}" type="datetimeFigureOut">
               <a:rPr lang="en-US" dirty="0"/>
               <a:pPr/>
-              <a:t>6/26/17</a:t>
+              <a:t>7/11/17</a:t>
             </a:fld>
             <a:endParaRPr lang="en-US" dirty="0"/>
           </a:p>
@@ -1838,7 +1924,7 @@
             <a:fld id="{48A87A34-81AB-432B-8DAE-1953F412C126}" type="datetimeFigureOut">
               <a:rPr lang="en-US" dirty="0"/>
               <a:pPr/>
-              <a:t>6/26/17</a:t>
+              <a:t>7/11/17</a:t>
             </a:fld>
             <a:endParaRPr lang="en-US" dirty="0"/>
           </a:p>
@@ -2307,7 +2393,7 @@
             <a:fld id="{48A87A34-81AB-432B-8DAE-1953F412C126}" type="datetimeFigureOut">
               <a:rPr lang="en-US" dirty="0"/>
               <a:pPr/>
-              <a:t>6/26/17</a:t>
+              <a:t>7/11/17</a:t>
             </a:fld>
             <a:endParaRPr lang="en-US" dirty="0"/>
           </a:p>
@@ -2849,7 +2935,7 @@
           <a:p>
             <a:fld id="{48A87A34-81AB-432B-8DAE-1953F412C126}" type="datetimeFigureOut">
               <a:rPr lang="en-US" dirty="0"/>
-              <a:t>6/26/17</a:t>
+              <a:t>7/11/17</a:t>
             </a:fld>
             <a:endParaRPr lang="en-US" dirty="0"/>
           </a:p>
@@ -3618,7 +3704,7 @@
           <a:p>
             <a:fld id="{48A87A34-81AB-432B-8DAE-1953F412C126}" type="datetimeFigureOut">
               <a:rPr lang="en-US" dirty="0"/>
-              <a:t>6/26/17</a:t>
+              <a:t>7/11/17</a:t>
             </a:fld>
             <a:endParaRPr lang="en-US" dirty="0"/>
           </a:p>
@@ -3788,7 +3874,7 @@
           <a:p>
             <a:fld id="{48A87A34-81AB-432B-8DAE-1953F412C126}" type="datetimeFigureOut">
               <a:rPr lang="en-US" dirty="0"/>
-              <a:t>6/26/17</a:t>
+              <a:t>7/11/17</a:t>
             </a:fld>
             <a:endParaRPr lang="en-US" dirty="0"/>
           </a:p>
@@ -4007,7 +4093,7 @@
             <a:fld id="{48A87A34-81AB-432B-8DAE-1953F412C126}" type="datetimeFigureOut">
               <a:rPr lang="en-US" dirty="0"/>
               <a:pPr/>
-              <a:t>6/26/17</a:t>
+              <a:t>7/11/17</a:t>
             </a:fld>
             <a:endParaRPr lang="en-US" dirty="0"/>
           </a:p>
@@ -4182,7 +4268,7 @@
           <a:p>
             <a:fld id="{48A87A34-81AB-432B-8DAE-1953F412C126}" type="datetimeFigureOut">
               <a:rPr lang="en-US" dirty="0"/>
-              <a:t>6/26/17</a:t>
+              <a:t>7/11/17</a:t>
             </a:fld>
             <a:endParaRPr lang="en-US" dirty="0"/>
           </a:p>
@@ -4467,7 +4553,7 @@
             <a:fld id="{48A87A34-81AB-432B-8DAE-1953F412C126}" type="datetimeFigureOut">
               <a:rPr lang="en-US" dirty="0"/>
               <a:pPr/>
-              <a:t>6/26/17</a:t>
+              <a:t>7/11/17</a:t>
             </a:fld>
             <a:endParaRPr lang="en-US" dirty="0"/>
           </a:p>
@@ -4704,7 +4790,7 @@
           <a:p>
             <a:fld id="{48A87A34-81AB-432B-8DAE-1953F412C126}" type="datetimeFigureOut">
               <a:rPr lang="en-US" dirty="0"/>
-              <a:t>6/26/17</a:t>
+              <a:t>7/11/17</a:t>
             </a:fld>
             <a:endParaRPr lang="en-US" dirty="0"/>
           </a:p>
@@ -5078,7 +5164,7 @@
           <a:p>
             <a:fld id="{48A87A34-81AB-432B-8DAE-1953F412C126}" type="datetimeFigureOut">
               <a:rPr lang="en-US" dirty="0"/>
-              <a:t>6/26/17</a:t>
+              <a:t>7/11/17</a:t>
             </a:fld>
             <a:endParaRPr lang="en-US" dirty="0"/>
           </a:p>
@@ -5191,7 +5277,7 @@
           <a:p>
             <a:fld id="{48A87A34-81AB-432B-8DAE-1953F412C126}" type="datetimeFigureOut">
               <a:rPr lang="en-US" dirty="0"/>
-              <a:t>6/26/17</a:t>
+              <a:t>7/11/17</a:t>
             </a:fld>
             <a:endParaRPr lang="en-US" dirty="0"/>
           </a:p>
@@ -5281,7 +5367,7 @@
           <a:p>
             <a:fld id="{48A87A34-81AB-432B-8DAE-1953F412C126}" type="datetimeFigureOut">
               <a:rPr lang="en-US" dirty="0"/>
-              <a:t>6/26/17</a:t>
+              <a:t>7/11/17</a:t>
             </a:fld>
             <a:endParaRPr lang="en-US" dirty="0"/>
           </a:p>
@@ -5525,7 +5611,7 @@
           <a:p>
             <a:fld id="{48A87A34-81AB-432B-8DAE-1953F412C126}" type="datetimeFigureOut">
               <a:rPr lang="en-US" dirty="0"/>
-              <a:t>6/26/17</a:t>
+              <a:t>7/11/17</a:t>
             </a:fld>
             <a:endParaRPr lang="en-US" dirty="0"/>
           </a:p>
@@ -5777,7 +5863,7 @@
           <a:p>
             <a:fld id="{48A87A34-81AB-432B-8DAE-1953F412C126}" type="datetimeFigureOut">
               <a:rPr lang="en-US" dirty="0"/>
-              <a:t>6/26/17</a:t>
+              <a:t>7/11/17</a:t>
             </a:fld>
             <a:endParaRPr lang="en-US" dirty="0"/>
           </a:p>
@@ -6016,7 +6102,7 @@
             <a:fld id="{48A87A34-81AB-432B-8DAE-1953F412C126}" type="datetimeFigureOut">
               <a:rPr lang="en-US" dirty="0"/>
               <a:pPr/>
-              <a:t>6/26/17</a:t>
+              <a:t>7/11/17</a:t>
             </a:fld>
             <a:endParaRPr lang="en-US" dirty="0"/>
           </a:p>
@@ -6666,8 +6752,8 @@
         </p:blipFill>
         <p:spPr>
           <a:xfrm>
-            <a:off x="9957423" y="4295020"/>
-            <a:ext cx="2286415" cy="2562980"/>
+            <a:off x="9957423" y="4204928"/>
+            <a:ext cx="2234577" cy="2653072"/>
           </a:xfrm>
           <a:prstGeom prst="rect">
             <a:avLst/>
@@ -6678,6 +6764,104 @@
     <p:extLst>
       <p:ext uri="{BB962C8B-B14F-4D97-AF65-F5344CB8AC3E}">
         <p14:creationId xmlns:p14="http://schemas.microsoft.com/office/powerpoint/2010/main" val="1804289383"/>
+      </p:ext>
+    </p:extLst>
+  </p:cSld>
+  <p:clrMapOvr>
+    <a:masterClrMapping/>
+  </p:clrMapOvr>
+  <p:timing>
+    <p:tnLst>
+      <p:par>
+        <p:cTn id="1" dur="indefinite" restart="never" nodeType="tmRoot"/>
+      </p:par>
+    </p:tnLst>
+  </p:timing>
+</p:sld>
+</file>
+
+<file path=ppt/slides/slide10.xml><?xml version="1.0" encoding="utf-8"?>
+<p:sld xmlns:a="http://schemas.openxmlformats.org/drawingml/2006/main" xmlns:r="http://schemas.openxmlformats.org/officeDocument/2006/relationships" xmlns:p="http://schemas.openxmlformats.org/presentationml/2006/main">
+  <p:cSld>
+    <p:spTree>
+      <p:nvGrpSpPr>
+        <p:cNvPr id="1" name=""/>
+        <p:cNvGrpSpPr/>
+        <p:nvPr/>
+      </p:nvGrpSpPr>
+      <p:grpSpPr>
+        <a:xfrm>
+          <a:off x="0" y="0"/>
+          <a:ext cx="0" cy="0"/>
+          <a:chOff x="0" y="0"/>
+          <a:chExt cx="0" cy="0"/>
+        </a:xfrm>
+      </p:grpSpPr>
+      <p:sp>
+        <p:nvSpPr>
+          <p:cNvPr id="2" name="Title 1"/>
+          <p:cNvSpPr>
+            <a:spLocks noGrp="1"/>
+          </p:cNvSpPr>
+          <p:nvPr>
+            <p:ph type="title"/>
+          </p:nvPr>
+        </p:nvSpPr>
+        <p:spPr>
+          <a:xfrm>
+            <a:off x="3831019" y="654014"/>
+            <a:ext cx="3654973" cy="1293028"/>
+          </a:xfrm>
+        </p:spPr>
+        <p:txBody>
+          <a:bodyPr/>
+          <a:lstStyle/>
+          <a:p>
+            <a:r>
+              <a:rPr lang="en-US" dirty="0" smtClean="0"/>
+              <a:t>THANK You</a:t>
+            </a:r>
+            <a:r>
+              <a:rPr lang="en-US" smtClean="0"/>
+              <a:t>! </a:t>
+            </a:r>
+            <a:endParaRPr lang="en-US" dirty="0"/>
+          </a:p>
+        </p:txBody>
+      </p:sp>
+      <p:pic>
+        <p:nvPicPr>
+          <p:cNvPr id="4" name="Content Placeholder 3"/>
+          <p:cNvPicPr>
+            <a:picLocks noGrp="1" noChangeAspect="1"/>
+          </p:cNvPicPr>
+          <p:nvPr>
+            <p:ph idx="1"/>
+          </p:nvPr>
+        </p:nvPicPr>
+        <p:blipFill>
+          <a:blip r:embed="rId2">
+            <a:extLst>
+              <a:ext uri="{28A0092B-C50C-407E-A947-70E740481C1C}">
+                <a14:useLocalDpi xmlns:a14="http://schemas.microsoft.com/office/drawing/2010/main" val="0"/>
+              </a:ext>
+            </a:extLst>
+          </a:blip>
+          <a:stretch>
+            <a:fillRect/>
+          </a:stretch>
+        </p:blipFill>
+        <p:spPr>
+          <a:xfrm>
+            <a:off x="338520" y="1655379"/>
+            <a:ext cx="11085410" cy="4713889"/>
+          </a:xfrm>
+        </p:spPr>
+      </p:pic>
+    </p:spTree>
+    <p:extLst>
+      <p:ext uri="{BB962C8B-B14F-4D97-AF65-F5344CB8AC3E}">
+        <p14:creationId xmlns:p14="http://schemas.microsoft.com/office/powerpoint/2010/main" val="1725138377"/>
       </p:ext>
     </p:extLst>
   </p:cSld>
@@ -6711,38 +6895,38 @@
             <a:spLocks noGrp="1"/>
           </p:cNvSpPr>
           <p:nvPr>
-            <p:ph type="title"/>
-          </p:nvPr>
-        </p:nvSpPr>
-        <p:spPr>
-          <a:xfrm>
-            <a:off x="3456802" y="901532"/>
-            <a:ext cx="5278395" cy="1293028"/>
-          </a:xfrm>
-        </p:spPr>
+            <p:ph type="ctrTitle"/>
+          </p:nvPr>
+        </p:nvSpPr>
+        <p:spPr/>
         <p:txBody>
           <a:bodyPr/>
           <a:lstStyle/>
           <a:p>
             <a:r>
               <a:rPr lang="en-US" dirty="0" smtClean="0"/>
-              <a:t>Table of Contents</a:t>
-            </a:r>
-            <a:endParaRPr lang="en-US" dirty="0"/>
-          </a:p>
-        </p:txBody>
-      </p:sp>
-      <p:sp>
-        <p:nvSpPr>
-          <p:cNvPr id="3" name="Content Placeholder 2"/>
-          <p:cNvSpPr>
-            <a:spLocks noGrp="1"/>
-          </p:cNvSpPr>
-          <p:nvPr>
-            <p:ph idx="1"/>
-          </p:nvPr>
-        </p:nvSpPr>
-        <p:spPr/>
+              <a:t>Part I: Motivation</a:t>
+            </a:r>
+            <a:endParaRPr lang="en-US" dirty="0"/>
+          </a:p>
+        </p:txBody>
+      </p:sp>
+      <p:sp>
+        <p:nvSpPr>
+          <p:cNvPr id="3" name="Subtitle 2"/>
+          <p:cNvSpPr>
+            <a:spLocks noGrp="1"/>
+          </p:cNvSpPr>
+          <p:nvPr>
+            <p:ph type="subTitle" idx="1"/>
+          </p:nvPr>
+        </p:nvSpPr>
+        <p:spPr>
+          <a:xfrm>
+            <a:off x="1371600" y="3632200"/>
+            <a:ext cx="9448800" cy="1524415"/>
+          </a:xfrm>
+        </p:spPr>
         <p:txBody>
           <a:bodyPr>
             <a:normAutofit/>
@@ -6750,41 +6934,54 @@
           <a:lstStyle/>
           <a:p>
             <a:r>
-              <a:rPr lang="en-US" sz="4000" dirty="0" smtClean="0"/>
-              <a:t>Part I: Motivation</a:t>
-            </a:r>
-          </a:p>
-          <a:p>
-            <a:r>
-              <a:rPr lang="en-US" sz="4000" dirty="0" smtClean="0"/>
-              <a:t>Part II: Procedure </a:t>
-            </a:r>
-          </a:p>
-          <a:p>
-            <a:r>
-              <a:rPr lang="en-US" sz="4000" dirty="0" smtClean="0"/>
-              <a:t>Part III: Input / Output</a:t>
-            </a:r>
-          </a:p>
-          <a:p>
-            <a:r>
-              <a:rPr lang="en-US" sz="4000" dirty="0" smtClean="0"/>
-              <a:t>Part IV: Conclusion / Looking Ahead </a:t>
-            </a:r>
-            <a:endParaRPr lang="en-US" sz="4000" dirty="0"/>
+              <a:rPr lang="en-US" dirty="0" smtClean="0"/>
+              <a:t>Needs / Reason to make the CIDAR Lab “Programmable</a:t>
+            </a:r>
+            <a:r>
+              <a:rPr lang="en-US" dirty="0" smtClean="0"/>
+              <a:t>” with HTML </a:t>
+            </a:r>
+            <a:endParaRPr lang="en-US" dirty="0" smtClean="0"/>
+          </a:p>
+          <a:p>
+            <a:r>
+              <a:rPr lang="en-US" dirty="0" smtClean="0"/>
+              <a:t>Rohin’s Main Reason</a:t>
+            </a:r>
+          </a:p>
+          <a:p>
+            <a:r>
+              <a:rPr lang="en-US" dirty="0" smtClean="0"/>
+              <a:t>Jason’s Main </a:t>
+            </a:r>
+            <a:r>
+              <a:rPr lang="en-US" dirty="0" smtClean="0"/>
+              <a:t>Reason</a:t>
+            </a:r>
+            <a:endParaRPr lang="en-US" dirty="0" smtClean="0"/>
+          </a:p>
+          <a:p>
+            <a:endParaRPr lang="en-US" dirty="0"/>
           </a:p>
         </p:txBody>
       </p:sp>
     </p:spTree>
     <p:extLst>
       <p:ext uri="{BB962C8B-B14F-4D97-AF65-F5344CB8AC3E}">
-        <p14:creationId xmlns:p14="http://schemas.microsoft.com/office/powerpoint/2010/main" val="429857344"/>
+        <p14:creationId xmlns:p14="http://schemas.microsoft.com/office/powerpoint/2010/main" val="1605894428"/>
       </p:ext>
     </p:extLst>
   </p:cSld>
   <p:clrMapOvr>
     <a:masterClrMapping/>
   </p:clrMapOvr>
+  <p:timing>
+    <p:tnLst>
+      <p:par>
+        <p:cTn id="1" dur="indefinite" restart="never" nodeType="tmRoot"/>
+      </p:par>
+    </p:tnLst>
+  </p:timing>
 </p:sld>
 </file>
 
@@ -6812,7 +7009,7 @@
             <a:spLocks noGrp="1"/>
           </p:cNvSpPr>
           <p:nvPr>
-            <p:ph type="ctrTitle"/>
+            <p:ph type="title"/>
           </p:nvPr>
         </p:nvSpPr>
         <p:spPr/>
@@ -6822,70 +7019,120 @@
           <a:p>
             <a:r>
               <a:rPr lang="en-US" dirty="0" smtClean="0"/>
-              <a:t>Part I: Motivation</a:t>
-            </a:r>
-            <a:endParaRPr lang="en-US" dirty="0"/>
-          </a:p>
-        </p:txBody>
-      </p:sp>
-      <p:sp>
-        <p:nvSpPr>
-          <p:cNvPr id="3" name="Subtitle 2"/>
-          <p:cNvSpPr>
-            <a:spLocks noGrp="1"/>
-          </p:cNvSpPr>
-          <p:nvPr>
-            <p:ph type="subTitle" idx="1"/>
-          </p:nvPr>
-        </p:nvSpPr>
-        <p:spPr>
-          <a:xfrm>
-            <a:off x="1371600" y="3632200"/>
-            <a:ext cx="9448800" cy="1524415"/>
-          </a:xfrm>
-        </p:spPr>
+              <a:t>Reason 1: HTML can make data accessible to all users</a:t>
+            </a:r>
+            <a:endParaRPr lang="en-US" dirty="0"/>
+          </a:p>
+        </p:txBody>
+      </p:sp>
+      <p:sp>
+        <p:nvSpPr>
+          <p:cNvPr id="3" name="Content Placeholder 2"/>
+          <p:cNvSpPr>
+            <a:spLocks noGrp="1"/>
+          </p:cNvSpPr>
+          <p:nvPr>
+            <p:ph idx="1"/>
+          </p:nvPr>
+        </p:nvSpPr>
+        <p:spPr/>
         <p:txBody>
           <a:bodyPr>
-            <a:normAutofit lnSpcReduction="10000"/>
+            <a:normAutofit/>
           </a:bodyPr>
           <a:lstStyle/>
           <a:p>
             <a:r>
-              <a:rPr lang="en-US" dirty="0" smtClean="0"/>
-              <a:t>Needs / Reason to make the CIDAR Lab “Programmable” </a:t>
-            </a:r>
-          </a:p>
-          <a:p>
-            <a:r>
-              <a:rPr lang="en-US" dirty="0" err="1" smtClean="0"/>
-              <a:t>Rohin’s</a:t>
-            </a:r>
-            <a:r>
-              <a:rPr lang="en-US" dirty="0" smtClean="0"/>
-              <a:t> Main Reason</a:t>
-            </a:r>
-          </a:p>
-          <a:p>
-            <a:r>
-              <a:rPr lang="en-US" dirty="0" smtClean="0"/>
-              <a:t>Jason’s Main Reason</a:t>
-            </a:r>
-          </a:p>
-          <a:p>
-            <a:r>
-              <a:rPr lang="en-US" dirty="0" smtClean="0"/>
-              <a:t>Challenges / Conflicts</a:t>
-            </a:r>
-          </a:p>
-          <a:p>
-            <a:endParaRPr lang="en-US" dirty="0"/>
+              <a:rPr lang="en-US" dirty="0" smtClean="0">
+                <a:solidFill>
+                  <a:srgbClr val="FFFF00"/>
+                </a:solidFill>
+              </a:rPr>
+              <a:t>HTML 5 was the choice language for making Rohin’s / CIDAR LAB data from the Excel spreadsheet more “programmable”:</a:t>
+            </a:r>
+          </a:p>
+          <a:p>
+            <a:endParaRPr lang="en-US" dirty="0" smtClean="0">
+              <a:solidFill>
+                <a:srgbClr val="FFFF00"/>
+              </a:solidFill>
+            </a:endParaRPr>
+          </a:p>
+          <a:p>
+            <a:r>
+              <a:rPr lang="en-US" dirty="0" smtClean="0">
+                <a:solidFill>
+                  <a:srgbClr val="FFFF00"/>
+                </a:solidFill>
+              </a:rPr>
+              <a:t>1) </a:t>
+            </a:r>
+            <a:r>
+              <a:rPr lang="en-US" dirty="0" smtClean="0">
+                <a:solidFill>
+                  <a:srgbClr val="FFFF00"/>
+                </a:solidFill>
+              </a:rPr>
+              <a:t>Compact</a:t>
+            </a:r>
+            <a:endParaRPr lang="en-US" dirty="0" smtClean="0">
+              <a:solidFill>
+                <a:srgbClr val="FFFF00"/>
+              </a:solidFill>
+            </a:endParaRPr>
+          </a:p>
+          <a:p>
+            <a:r>
+              <a:rPr lang="en-US" dirty="0" smtClean="0">
+                <a:solidFill>
+                  <a:srgbClr val="FFFF00"/>
+                </a:solidFill>
+              </a:rPr>
+              <a:t>2) Updates more quickly / </a:t>
+            </a:r>
+            <a:r>
+              <a:rPr lang="en-US" dirty="0" smtClean="0">
+                <a:solidFill>
+                  <a:srgbClr val="FFFF00"/>
+                </a:solidFill>
+              </a:rPr>
+              <a:t>easily</a:t>
+            </a:r>
+            <a:endParaRPr lang="en-US" dirty="0" smtClean="0">
+              <a:solidFill>
+                <a:srgbClr val="FFFF00"/>
+              </a:solidFill>
+            </a:endParaRPr>
+          </a:p>
+          <a:p>
+            <a:r>
+              <a:rPr lang="en-US" dirty="0" smtClean="0">
+                <a:solidFill>
+                  <a:srgbClr val="FFFF00"/>
+                </a:solidFill>
+              </a:rPr>
+              <a:t>3) Accessible for all STEM Pathways </a:t>
+            </a:r>
+            <a:r>
+              <a:rPr lang="en-US" dirty="0" smtClean="0">
+                <a:solidFill>
+                  <a:srgbClr val="FFFF00"/>
+                </a:solidFill>
+              </a:rPr>
+              <a:t>researchers</a:t>
+            </a:r>
+            <a:endParaRPr lang="en-US" dirty="0">
+              <a:solidFill>
+                <a:srgbClr val="FFFF00"/>
+              </a:solidFill>
+            </a:endParaRPr>
           </a:p>
         </p:txBody>
       </p:sp>
     </p:spTree>
     <p:extLst>
       <p:ext uri="{BB962C8B-B14F-4D97-AF65-F5344CB8AC3E}">
-        <p14:creationId xmlns:p14="http://schemas.microsoft.com/office/powerpoint/2010/main" val="1605894428"/>
+        <p14:creationId xmlns:p14="http://schemas.microsoft.com/office/powerpoint/2010/main" val="110613202"/>
       </p:ext>
     </p:extLst>
   </p:cSld>
@@ -6919,7 +7166,7 @@
             <a:spLocks noGrp="1"/>
           </p:cNvSpPr>
           <p:nvPr>
-            <p:ph type="ctrTitle"/>
+            <p:ph type="title"/>
           </p:nvPr>
         </p:nvSpPr>
         <p:spPr/>
@@ -6929,35 +7176,112 @@
           <a:p>
             <a:r>
               <a:rPr lang="en-US" dirty="0" smtClean="0"/>
-              <a:t>Why HTML / CSS?</a:t>
-            </a:r>
-            <a:endParaRPr lang="en-US" dirty="0"/>
-          </a:p>
-        </p:txBody>
-      </p:sp>
-      <p:sp>
-        <p:nvSpPr>
-          <p:cNvPr id="3" name="Subtitle 2"/>
-          <p:cNvSpPr>
-            <a:spLocks noGrp="1"/>
-          </p:cNvSpPr>
-          <p:nvPr>
-            <p:ph type="subTitle" idx="1"/>
+              <a:t>Reason 2: HTML is by default “the website builder”</a:t>
+            </a:r>
+            <a:endParaRPr lang="en-US" dirty="0"/>
+          </a:p>
+        </p:txBody>
+      </p:sp>
+      <p:sp>
+        <p:nvSpPr>
+          <p:cNvPr id="3" name="Content Placeholder 2"/>
+          <p:cNvSpPr>
+            <a:spLocks noGrp="1"/>
+          </p:cNvSpPr>
+          <p:nvPr>
+            <p:ph idx="1"/>
           </p:nvPr>
         </p:nvSpPr>
         <p:spPr/>
         <p:txBody>
-          <a:bodyPr/>
-          <a:lstStyle/>
-          <a:p>
-            <a:endParaRPr lang="en-US" dirty="0"/>
+          <a:bodyPr>
+            <a:noAutofit/>
+          </a:bodyPr>
+          <a:lstStyle/>
+          <a:p>
+            <a:r>
+              <a:rPr lang="en-US" sz="2800" dirty="0" smtClean="0"/>
+              <a:t>Majority of websites on the web were built from HTML</a:t>
+            </a:r>
+          </a:p>
+          <a:p>
+            <a:r>
+              <a:rPr lang="en-US" sz="2800" dirty="0" smtClean="0"/>
+              <a:t>B</a:t>
+            </a:r>
+            <a:r>
+              <a:rPr lang="en-US" sz="2800" dirty="0" smtClean="0"/>
+              <a:t>oot-strapped with </a:t>
+            </a:r>
+            <a:r>
+              <a:rPr lang="en-US" sz="2800" dirty="0" smtClean="0"/>
+              <a:t>other languages </a:t>
+            </a:r>
+            <a:endParaRPr lang="en-US" sz="2800" dirty="0" smtClean="0"/>
+          </a:p>
+          <a:p>
+            <a:r>
+              <a:rPr lang="en-US" sz="2800" dirty="0" smtClean="0"/>
+              <a:t>Easy </a:t>
+            </a:r>
+            <a:r>
+              <a:rPr lang="en-US" sz="2800" dirty="0" smtClean="0"/>
+              <a:t>to add </a:t>
+            </a:r>
+            <a:r>
+              <a:rPr lang="en-US" sz="2800" dirty="0" smtClean="0"/>
+              <a:t>dependencies</a:t>
+            </a:r>
+            <a:endParaRPr lang="en-US" sz="2800" dirty="0" smtClean="0"/>
+          </a:p>
+          <a:p>
+            <a:r>
+              <a:rPr lang="en-US" sz="2800" dirty="0" smtClean="0"/>
+              <a:t>Can be run without browser </a:t>
+            </a:r>
+            <a:endParaRPr lang="en-US" sz="2800" dirty="0" smtClean="0"/>
+          </a:p>
+          <a:p>
+            <a:r>
+              <a:rPr lang="en-US" sz="2800" dirty="0" smtClean="0"/>
+              <a:t>Most </a:t>
+            </a:r>
+            <a:r>
+              <a:rPr lang="en-US" sz="2800" dirty="0" smtClean="0"/>
+              <a:t>important of them all: </a:t>
+            </a:r>
+            <a:r>
+              <a:rPr lang="en-US" sz="2800" dirty="0" smtClean="0">
+                <a:solidFill>
+                  <a:srgbClr val="00B0F0"/>
+                </a:solidFill>
+              </a:rPr>
+              <a:t>easy </a:t>
+            </a:r>
+            <a:r>
+              <a:rPr lang="en-US" sz="2800" dirty="0" smtClean="0">
+                <a:solidFill>
+                  <a:srgbClr val="00B0F0"/>
+                </a:solidFill>
+              </a:rPr>
+              <a:t>to </a:t>
+            </a:r>
+            <a:r>
+              <a:rPr lang="en-US" sz="2800" dirty="0" smtClean="0">
+                <a:solidFill>
+                  <a:srgbClr val="00B0F0"/>
+                </a:solidFill>
+              </a:rPr>
+              <a:t>use</a:t>
+            </a:r>
+            <a:endParaRPr lang="en-US" sz="2800" dirty="0"/>
           </a:p>
         </p:txBody>
       </p:sp>
     </p:spTree>
     <p:extLst>
       <p:ext uri="{BB962C8B-B14F-4D97-AF65-F5344CB8AC3E}">
-        <p14:creationId xmlns:p14="http://schemas.microsoft.com/office/powerpoint/2010/main" val="11614769"/>
+        <p14:creationId xmlns:p14="http://schemas.microsoft.com/office/powerpoint/2010/main" val="815774123"/>
       </p:ext>
     </p:extLst>
   </p:cSld>
@@ -7001,7 +7325,7 @@
           <a:p>
             <a:r>
               <a:rPr lang="en-US" dirty="0" smtClean="0"/>
-              <a:t>Reason 1: HTML can make data accessible to all users</a:t>
+              <a:t>Reason 3: It Works with anything</a:t>
             </a:r>
             <a:endParaRPr lang="en-US" dirty="0"/>
           </a:p>
@@ -7020,88 +7344,74 @@
         <p:spPr/>
         <p:txBody>
           <a:bodyPr>
-            <a:normAutofit fontScale="92500" lnSpcReduction="10000"/>
+            <a:normAutofit/>
           </a:bodyPr>
           <a:lstStyle/>
           <a:p>
             <a:r>
-              <a:rPr lang="en-US" dirty="0" smtClean="0">
+              <a:rPr lang="en-US" sz="2800" dirty="0" smtClean="0"/>
+              <a:t>HTML least likely to deal with troublesome compile errors </a:t>
+            </a:r>
+          </a:p>
+          <a:p>
+            <a:r>
+              <a:rPr lang="en-US" sz="2800" dirty="0" smtClean="0"/>
+              <a:t>Eclipse makes it particularly easy to debug / fix error </a:t>
+            </a:r>
+          </a:p>
+          <a:p>
+            <a:r>
+              <a:rPr lang="en-US" sz="2800" dirty="0" smtClean="0"/>
+              <a:t>Simple codes that explain what went wrong (if errors does occur): </a:t>
+            </a:r>
+          </a:p>
+          <a:p>
+            <a:endParaRPr lang="en-US" sz="2800" dirty="0"/>
+          </a:p>
+          <a:p>
+            <a:r>
+              <a:rPr lang="en-US" sz="2800" dirty="0" smtClean="0">
                 <a:solidFill>
-                  <a:srgbClr val="FFFF00"/>
+                  <a:srgbClr val="92D050"/>
                 </a:solidFill>
               </a:rPr>
-              <a:t>HTML 5 was the choice language for making </a:t>
-            </a:r>
-            <a:r>
-              <a:rPr lang="en-US" dirty="0" err="1" smtClean="0">
+              <a:t>Reference</a:t>
+            </a:r>
+            <a:r>
+              <a:rPr lang="en-US" sz="2800" dirty="0">
                 <a:solidFill>
-                  <a:srgbClr val="FFFF00"/>
+                  <a:srgbClr val="92D050"/>
                 </a:solidFill>
               </a:rPr>
-              <a:t>Rohin’s</a:t>
-            </a:r>
-            <a:r>
-              <a:rPr lang="en-US" dirty="0" smtClean="0">
+              <a:t>: https://</a:t>
+            </a:r>
+            <a:r>
+              <a:rPr lang="en-US" sz="2800" dirty="0" err="1">
                 <a:solidFill>
-                  <a:srgbClr val="FFFF00"/>
+                  <a:srgbClr val="92D050"/>
                 </a:solidFill>
               </a:rPr>
-              <a:t> / CIDAR LAB data from the Excel spreadsheet more “programmable”:</a:t>
-            </a:r>
-          </a:p>
-          <a:p>
-            <a:endParaRPr lang="en-US" dirty="0" smtClean="0">
-              <a:solidFill>
-                <a:srgbClr val="FFFF00"/>
-              </a:solidFill>
-            </a:endParaRPr>
-          </a:p>
-          <a:p>
-            <a:r>
-              <a:rPr lang="en-US" dirty="0" smtClean="0">
+              <a:t>en.wikipedia.org</a:t>
+            </a:r>
+            <a:r>
+              <a:rPr lang="en-US" sz="2800" dirty="0">
                 <a:solidFill>
-                  <a:srgbClr val="FFFF00"/>
+                  <a:srgbClr val="92D050"/>
                 </a:solidFill>
               </a:rPr>
-              <a:t>1) Compact, the data can be easier to read with 4 distinct tables (primers, LCR assembly, procedures, and DNA fragments) than 1 table </a:t>
-            </a:r>
-          </a:p>
-          <a:p>
-            <a:endParaRPr lang="en-US" dirty="0" smtClean="0">
-              <a:solidFill>
-                <a:srgbClr val="FFFF00"/>
-              </a:solidFill>
-            </a:endParaRPr>
-          </a:p>
-          <a:p>
-            <a:r>
-              <a:rPr lang="en-US" dirty="0" smtClean="0">
+              <a:t>/wiki/</a:t>
+            </a:r>
+            <a:r>
+              <a:rPr lang="en-US" sz="2800" dirty="0" err="1">
                 <a:solidFill>
-                  <a:srgbClr val="FFFF00"/>
+                  <a:srgbClr val="92D050"/>
                 </a:solidFill>
               </a:rPr>
-              <a:t>2) Updates more quickly / easily – instead of repeated laboratory experiments to update data, HTML allows uploads of lab data and images from the Desktop / Windows </a:t>
-            </a:r>
-          </a:p>
-          <a:p>
-            <a:endParaRPr lang="en-US" dirty="0" smtClean="0">
+              <a:t>List_of_HTTP_status_codes</a:t>
+            </a:r>
+            <a:endParaRPr lang="en-US" sz="2800" dirty="0" smtClean="0">
               <a:solidFill>
-                <a:srgbClr val="FFFF00"/>
-              </a:solidFill>
-            </a:endParaRPr>
-          </a:p>
-          <a:p>
-            <a:r>
-              <a:rPr lang="en-US" dirty="0" smtClean="0">
-                <a:solidFill>
-                  <a:srgbClr val="FFFF00"/>
-                </a:solidFill>
-              </a:rPr>
-              <a:t>3) Accessible for all STEM Pathways majors – code only used to show data / no CS background necessary to understand</a:t>
-            </a:r>
-            <a:endParaRPr lang="en-US" dirty="0">
-              <a:solidFill>
-                <a:srgbClr val="FFFF00"/>
+                <a:srgbClr val="92D050"/>
               </a:solidFill>
             </a:endParaRPr>
           </a:p>
@@ -7110,7 +7420,7 @@
     </p:spTree>
     <p:extLst>
       <p:ext uri="{BB962C8B-B14F-4D97-AF65-F5344CB8AC3E}">
-        <p14:creationId xmlns:p14="http://schemas.microsoft.com/office/powerpoint/2010/main" val="110613202"/>
+        <p14:creationId xmlns:p14="http://schemas.microsoft.com/office/powerpoint/2010/main" val="1805816260"/>
       </p:ext>
     </p:extLst>
   </p:cSld>
@@ -7147,14 +7457,25 @@
             <p:ph type="title"/>
           </p:nvPr>
         </p:nvSpPr>
-        <p:spPr/>
-        <p:txBody>
-          <a:bodyPr/>
+        <p:spPr>
+          <a:xfrm>
+            <a:off x="685800" y="748608"/>
+            <a:ext cx="2953407" cy="1293028"/>
+          </a:xfrm>
+        </p:spPr>
+        <p:txBody>
+          <a:bodyPr>
+            <a:normAutofit fontScale="90000"/>
+          </a:bodyPr>
           <a:lstStyle/>
           <a:p>
             <a:r>
               <a:rPr lang="en-US" dirty="0" smtClean="0"/>
-              <a:t>Reason 2: HTML is by default “the website builder”</a:t>
+              <a:t>Jason’s (My) Main </a:t>
+            </a:r>
+            <a:r>
+              <a:rPr lang="en-US" dirty="0" smtClean="0"/>
+              <a:t>Reason </a:t>
             </a:r>
             <a:endParaRPr lang="en-US" dirty="0"/>
           </a:p>
@@ -7170,106 +7491,93 @@
             <p:ph idx="1"/>
           </p:nvPr>
         </p:nvSpPr>
-        <p:spPr/>
-        <p:txBody>
-          <a:bodyPr/>
-          <a:lstStyle/>
-          <a:p>
-            <a:r>
-              <a:rPr lang="en-US" dirty="0" smtClean="0"/>
-              <a:t>Majority of websites on the web were built from HTML</a:t>
-            </a:r>
-          </a:p>
-          <a:p>
-            <a:r>
-              <a:rPr lang="en-US" dirty="0" smtClean="0"/>
-              <a:t>Can be boot-strapped (</a:t>
-            </a:r>
-            <a:r>
-              <a:rPr lang="en-US" dirty="0" smtClean="0">
-                <a:solidFill>
-                  <a:srgbClr val="00B0F0"/>
-                </a:solidFill>
+        <p:spPr>
+          <a:xfrm>
+            <a:off x="685800" y="2194560"/>
+            <a:ext cx="4453759" cy="4024125"/>
+          </a:xfrm>
+        </p:spPr>
+        <p:txBody>
+          <a:bodyPr>
+            <a:normAutofit fontScale="70000" lnSpcReduction="20000"/>
+          </a:bodyPr>
+          <a:lstStyle/>
+          <a:p>
+            <a:r>
+              <a:rPr lang="en-US" sz="3200" dirty="0" smtClean="0"/>
+              <a:t>Incorporate the “inter-disciplinary” aspect on STEM Pathways </a:t>
+            </a:r>
+          </a:p>
+          <a:p>
+            <a:r>
+              <a:rPr lang="en-US" sz="3200" dirty="0" smtClean="0"/>
+              <a:t>Combine Computer Science and Microbiology for all users </a:t>
+            </a:r>
+          </a:p>
+          <a:p>
+            <a:r>
+              <a:rPr lang="en-US" sz="3200" dirty="0" smtClean="0"/>
+              <a:t>Make a website that will allow future CIDAR scientists to view data more easily (from previous lab experiments, DNA, primers</a:t>
+            </a:r>
+            <a:r>
+              <a:rPr lang="is-IS" sz="3200" dirty="0" smtClean="0"/>
+              <a:t>…) </a:t>
+            </a:r>
+          </a:p>
+          <a:p>
+            <a:r>
+              <a:rPr lang="is-IS" sz="3200" dirty="0" smtClean="0"/>
+              <a:t>Fun to use (pretty UI, good aesthetics, more appealing to users) / “easy on the eyes”</a:t>
+            </a:r>
+          </a:p>
+          <a:p>
+            <a:r>
+              <a:rPr lang="is-IS" sz="3200" dirty="0" smtClean="0"/>
+              <a:t>Exercise in Bio-Informatics </a:t>
+            </a:r>
+          </a:p>
+          <a:p>
+            <a:endParaRPr lang="en-US" dirty="0"/>
+          </a:p>
+        </p:txBody>
+      </p:sp>
+      <p:sp>
+        <p:nvSpPr>
+          <p:cNvPr id="4" name="Rectangle 3"/>
+          <p:cNvSpPr/>
+          <p:nvPr/>
+        </p:nvSpPr>
+        <p:spPr>
+          <a:xfrm>
+            <a:off x="6944050" y="471608"/>
+            <a:ext cx="4307856" cy="1200329"/>
+          </a:xfrm>
+          <a:prstGeom prst="rect">
+            <a:avLst/>
+          </a:prstGeom>
+        </p:spPr>
+        <p:txBody>
+          <a:bodyPr wrap="square">
+            <a:spAutoFit/>
+          </a:bodyPr>
+          <a:lstStyle/>
+          <a:p>
+            <a:r>
+              <a:rPr lang="en-US" sz="3600" dirty="0" smtClean="0">
+                <a:latin typeface="+mj-lt"/>
               </a:rPr>
-              <a:t>embedded</a:t>
-            </a:r>
-            <a:r>
-              <a:rPr lang="en-US" dirty="0" smtClean="0"/>
-              <a:t>) with other languages (CSS, Java, or even machine assembly languages) </a:t>
-            </a:r>
-          </a:p>
-          <a:p>
-            <a:r>
-              <a:rPr lang="en-US" dirty="0" smtClean="0"/>
-              <a:t>Easy to add dependencies (do not have to mess with Terminal) </a:t>
-            </a:r>
-          </a:p>
-          <a:p>
-            <a:r>
-              <a:rPr lang="en-US" dirty="0" smtClean="0"/>
-              <a:t>Can be run without browser (using a </a:t>
-            </a:r>
-            <a:r>
-              <a:rPr lang="en-US" dirty="0" err="1" smtClean="0"/>
-              <a:t>localhost</a:t>
-            </a:r>
-            <a:r>
-              <a:rPr lang="en-US" dirty="0" smtClean="0"/>
-              <a:t> port)</a:t>
-            </a:r>
-          </a:p>
-          <a:p>
-            <a:r>
-              <a:rPr lang="en-US" dirty="0" smtClean="0"/>
-              <a:t>Useful when networks are down / internet connection bad </a:t>
-            </a:r>
-          </a:p>
-          <a:p>
-            <a:r>
-              <a:rPr lang="en-US" dirty="0" smtClean="0"/>
-              <a:t>Most important of them all: easy to see and </a:t>
-            </a:r>
-            <a:r>
-              <a:rPr lang="en-US" dirty="0" smtClean="0">
-                <a:solidFill>
-                  <a:srgbClr val="00B0F0"/>
-                </a:solidFill>
-              </a:rPr>
-              <a:t>easy to use</a:t>
-            </a:r>
-            <a:r>
-              <a:rPr lang="en-US" dirty="0" smtClean="0"/>
-              <a:t> (no advanced CS coding background required, and code just an </a:t>
-            </a:r>
-            <a:r>
-              <a:rPr lang="en-US" dirty="0" smtClean="0">
-                <a:solidFill>
-                  <a:srgbClr val="00B0F0"/>
-                </a:solidFill>
-              </a:rPr>
-              <a:t>abstraction</a:t>
-            </a:r>
-            <a:r>
-              <a:rPr lang="en-US" dirty="0" smtClean="0"/>
-              <a:t> from the user) </a:t>
-            </a:r>
-          </a:p>
-          <a:p>
-            <a:endParaRPr lang="en-US" dirty="0"/>
-          </a:p>
-          <a:p>
-            <a:r>
-              <a:rPr lang="en-US" dirty="0" smtClean="0"/>
-              <a:t>Key terms: easy to use, abstraction, embedded</a:t>
-            </a:r>
-            <a:endParaRPr lang="en-US" dirty="0"/>
+              <a:t>ROHIN’S MAIN REASON</a:t>
+            </a:r>
+            <a:endParaRPr lang="en-US" sz="3600" dirty="0">
+              <a:latin typeface="+mj-lt"/>
+            </a:endParaRPr>
           </a:p>
         </p:txBody>
       </p:sp>
     </p:spTree>
     <p:extLst>
       <p:ext uri="{BB962C8B-B14F-4D97-AF65-F5344CB8AC3E}">
-        <p14:creationId xmlns:p14="http://schemas.microsoft.com/office/powerpoint/2010/main" val="815774123"/>
+        <p14:creationId xmlns:p14="http://schemas.microsoft.com/office/powerpoint/2010/main" val="602297893"/>
       </p:ext>
     </p:extLst>
   </p:cSld>
@@ -7303,7 +7611,7 @@
             <a:spLocks noGrp="1"/>
           </p:cNvSpPr>
           <p:nvPr>
-            <p:ph type="title"/>
+            <p:ph type="ctrTitle"/>
           </p:nvPr>
         </p:nvSpPr>
         <p:spPr/>
@@ -7312,127 +7620,41 @@
           <a:lstStyle/>
           <a:p>
             <a:r>
-              <a:rPr lang="en-US" dirty="0" smtClean="0"/>
-              <a:t>Reason 3: It Works with anything</a:t>
-            </a:r>
-            <a:endParaRPr lang="en-US" dirty="0"/>
-          </a:p>
-        </p:txBody>
-      </p:sp>
-      <p:sp>
-        <p:nvSpPr>
-          <p:cNvPr id="3" name="Content Placeholder 2"/>
-          <p:cNvSpPr>
-            <a:spLocks noGrp="1"/>
-          </p:cNvSpPr>
-          <p:nvPr>
-            <p:ph idx="1"/>
-          </p:nvPr>
-        </p:nvSpPr>
-        <p:spPr/>
-        <p:txBody>
-          <a:bodyPr>
-            <a:normAutofit lnSpcReduction="10000"/>
-          </a:bodyPr>
-          <a:lstStyle/>
-          <a:p>
-            <a:r>
-              <a:rPr lang="en-US" dirty="0" smtClean="0"/>
-              <a:t>HTML least likely to deal with troublesome compile errors </a:t>
-            </a:r>
-          </a:p>
-          <a:p>
-            <a:r>
-              <a:rPr lang="en-US" dirty="0" smtClean="0"/>
-              <a:t>Eclipse makes it particularly easy to debug / fix error </a:t>
-            </a:r>
-          </a:p>
-          <a:p>
-            <a:r>
-              <a:rPr lang="en-US" dirty="0" smtClean="0"/>
-              <a:t>Simple codes that explain what went wrong (if errors does occur): </a:t>
-            </a:r>
-          </a:p>
-          <a:p>
-            <a:r>
-              <a:rPr lang="en-US" dirty="0" smtClean="0"/>
-              <a:t>More formally: HTTP (Hypertext Transfer Protocol) Status Codes</a:t>
-            </a:r>
-          </a:p>
-          <a:p>
-            <a:r>
-              <a:rPr lang="en-US" dirty="0" smtClean="0"/>
-              <a:t>404: Website not found</a:t>
-            </a:r>
-          </a:p>
-          <a:p>
-            <a:r>
-              <a:rPr lang="en-US" dirty="0" smtClean="0"/>
-              <a:t>200: Website found / successful </a:t>
-            </a:r>
-          </a:p>
-          <a:p>
-            <a:r>
-              <a:rPr lang="en-US" dirty="0" smtClean="0"/>
-              <a:t>500: Internal Server Error (something is wrong with the browser / not user’s fault) </a:t>
-            </a:r>
-          </a:p>
-          <a:p>
-            <a:endParaRPr lang="en-US" dirty="0"/>
-          </a:p>
-          <a:p>
-            <a:r>
-              <a:rPr lang="en-US" dirty="0" smtClean="0">
-                <a:solidFill>
-                  <a:srgbClr val="92D050"/>
-                </a:solidFill>
-              </a:rPr>
-              <a:t>Reference</a:t>
-            </a:r>
-            <a:r>
-              <a:rPr lang="en-US" dirty="0">
-                <a:solidFill>
-                  <a:srgbClr val="92D050"/>
-                </a:solidFill>
-              </a:rPr>
-              <a:t>: https://</a:t>
-            </a:r>
-            <a:r>
-              <a:rPr lang="en-US" dirty="0" err="1">
-                <a:solidFill>
-                  <a:srgbClr val="92D050"/>
-                </a:solidFill>
-              </a:rPr>
-              <a:t>en.wikipedia.org</a:t>
-            </a:r>
-            <a:r>
-              <a:rPr lang="en-US" dirty="0">
-                <a:solidFill>
-                  <a:srgbClr val="92D050"/>
-                </a:solidFill>
-              </a:rPr>
-              <a:t>/wiki/</a:t>
-            </a:r>
-            <a:r>
-              <a:rPr lang="en-US" dirty="0" err="1">
-                <a:solidFill>
-                  <a:srgbClr val="92D050"/>
-                </a:solidFill>
-              </a:rPr>
-              <a:t>List_of_HTTP_status_codes</a:t>
-            </a:r>
-            <a:endParaRPr lang="en-US" dirty="0" smtClean="0">
-              <a:solidFill>
-                <a:srgbClr val="92D050"/>
-              </a:solidFill>
-            </a:endParaRPr>
+              <a:rPr lang="en-US" smtClean="0"/>
+              <a:t>Part II: Procedure</a:t>
+            </a:r>
+            <a:endParaRPr lang="en-US"/>
+          </a:p>
+        </p:txBody>
+      </p:sp>
+      <p:sp>
+        <p:nvSpPr>
+          <p:cNvPr id="3" name="Subtitle 2"/>
+          <p:cNvSpPr>
+            <a:spLocks noGrp="1"/>
+          </p:cNvSpPr>
+          <p:nvPr>
+            <p:ph type="subTitle" idx="1"/>
+          </p:nvPr>
+        </p:nvSpPr>
+        <p:spPr>
+          <a:xfrm>
+            <a:off x="1371600" y="3632200"/>
+            <a:ext cx="9448800" cy="2966719"/>
+          </a:xfrm>
+        </p:spPr>
+        <p:txBody>
+          <a:bodyPr/>
+          <a:lstStyle/>
+          <a:p>
+            <a:endParaRPr lang="en-US" dirty="0"/>
           </a:p>
         </p:txBody>
       </p:sp>
     </p:spTree>
     <p:extLst>
       <p:ext uri="{BB962C8B-B14F-4D97-AF65-F5344CB8AC3E}">
-        <p14:creationId xmlns:p14="http://schemas.microsoft.com/office/powerpoint/2010/main" val="1805816260"/>
+        <p14:creationId xmlns:p14="http://schemas.microsoft.com/office/powerpoint/2010/main" val="271059426"/>
       </p:ext>
     </p:extLst>
   </p:cSld>
@@ -7466,7 +7688,7 @@
             <a:spLocks noGrp="1"/>
           </p:cNvSpPr>
           <p:nvPr>
-            <p:ph type="title"/>
+            <p:ph type="ctrTitle"/>
           </p:nvPr>
         </p:nvSpPr>
         <p:spPr/>
@@ -7475,44 +7697,35 @@
           <a:lstStyle/>
           <a:p>
             <a:r>
-              <a:rPr lang="en-US" dirty="0" err="1" smtClean="0"/>
-              <a:t>Rohin’s</a:t>
-            </a:r>
-            <a:r>
               <a:rPr lang="en-US" dirty="0" smtClean="0"/>
-              <a:t> Main Reason</a:t>
-            </a:r>
-            <a:endParaRPr lang="en-US" dirty="0"/>
-          </a:p>
-        </p:txBody>
-      </p:sp>
-      <p:sp>
-        <p:nvSpPr>
-          <p:cNvPr id="3" name="Content Placeholder 2"/>
-          <p:cNvSpPr>
-            <a:spLocks noGrp="1"/>
-          </p:cNvSpPr>
-          <p:nvPr>
-            <p:ph idx="1"/>
-          </p:nvPr>
-        </p:nvSpPr>
-        <p:spPr/>
-        <p:txBody>
-          <a:bodyPr/>
-          <a:lstStyle/>
-          <a:p>
-            <a:r>
-              <a:rPr lang="en-US" dirty="0" smtClean="0"/>
-              <a:t>(let </a:t>
-            </a:r>
-            <a:r>
-              <a:rPr lang="en-US" dirty="0" err="1" smtClean="0"/>
-              <a:t>Rohin</a:t>
-            </a:r>
-            <a:r>
-              <a:rPr lang="en-US" dirty="0" smtClean="0"/>
-              <a:t> add this stuff) </a:t>
-            </a:r>
+              <a:t>Part III: Conclusion / looking ahead</a:t>
+            </a:r>
+            <a:endParaRPr lang="en-US" dirty="0"/>
+          </a:p>
+        </p:txBody>
+      </p:sp>
+      <p:sp>
+        <p:nvSpPr>
+          <p:cNvPr id="3" name="Subtitle 2"/>
+          <p:cNvSpPr>
+            <a:spLocks noGrp="1"/>
+          </p:cNvSpPr>
+          <p:nvPr>
+            <p:ph type="subTitle" idx="1"/>
+          </p:nvPr>
+        </p:nvSpPr>
+        <p:spPr>
+          <a:xfrm>
+            <a:off x="1371599" y="3632200"/>
+            <a:ext cx="10011103" cy="3099675"/>
+          </a:xfrm>
+        </p:spPr>
+        <p:txBody>
+          <a:bodyPr>
+            <a:normAutofit/>
+          </a:bodyPr>
+          <a:lstStyle/>
+          <a:p>
             <a:endParaRPr lang="en-US" dirty="0"/>
           </a:p>
         </p:txBody>
@@ -7520,7 +7733,7 @@
     </p:spTree>
     <p:extLst>
       <p:ext uri="{BB962C8B-B14F-4D97-AF65-F5344CB8AC3E}">
-        <p14:creationId xmlns:p14="http://schemas.microsoft.com/office/powerpoint/2010/main" val="1483732493"/>
+        <p14:creationId xmlns:p14="http://schemas.microsoft.com/office/powerpoint/2010/main" val="213975407"/>
       </p:ext>
     </p:extLst>
   </p:cSld>
@@ -7564,63 +7777,54 @@
           <a:p>
             <a:r>
               <a:rPr lang="en-US" dirty="0" smtClean="0"/>
-              <a:t>Jason’s (My) Main Reason</a:t>
-            </a:r>
-            <a:endParaRPr lang="en-US" dirty="0"/>
-          </a:p>
-        </p:txBody>
-      </p:sp>
-      <p:sp>
-        <p:nvSpPr>
-          <p:cNvPr id="3" name="Content Placeholder 2"/>
-          <p:cNvSpPr>
-            <a:spLocks noGrp="1"/>
-          </p:cNvSpPr>
-          <p:nvPr>
-            <p:ph idx="1"/>
+              <a:t>Design is not just what it looks like and feels like. Design is how it works.</a:t>
+            </a:r>
+            <a:endParaRPr lang="en-US" dirty="0"/>
+          </a:p>
+        </p:txBody>
+      </p:sp>
+      <p:sp>
+        <p:nvSpPr>
+          <p:cNvPr id="3" name="Text Placeholder 2"/>
+          <p:cNvSpPr>
+            <a:spLocks noGrp="1"/>
+          </p:cNvSpPr>
+          <p:nvPr>
+            <p:ph type="body" sz="half" idx="13"/>
           </p:nvPr>
         </p:nvSpPr>
         <p:spPr/>
         <p:txBody>
-          <a:bodyPr>
-            <a:normAutofit fontScale="92500" lnSpcReduction="20000"/>
-          </a:bodyPr>
-          <a:lstStyle/>
-          <a:p>
-            <a:r>
-              <a:rPr lang="en-US" sz="3200" dirty="0" smtClean="0"/>
-              <a:t>Incorporate the “inter-disciplinary” aspect on STEM Pathways </a:t>
-            </a:r>
-          </a:p>
-          <a:p>
-            <a:r>
-              <a:rPr lang="en-US" sz="3200" dirty="0" smtClean="0"/>
-              <a:t>Combine Computer Science and Microbiology for all users </a:t>
-            </a:r>
-          </a:p>
-          <a:p>
-            <a:r>
-              <a:rPr lang="en-US" sz="3200" dirty="0" smtClean="0"/>
-              <a:t>Make a website that will allow future CIDAR scientists to view data more easily (from previous lab experiments, DNA, primers</a:t>
-            </a:r>
-            <a:r>
-              <a:rPr lang="is-IS" sz="3200" dirty="0" smtClean="0"/>
-              <a:t>…) </a:t>
-            </a:r>
-          </a:p>
-          <a:p>
-            <a:r>
-              <a:rPr lang="is-IS" sz="3200" dirty="0" smtClean="0"/>
-              <a:t>Fun to use (pretty UI, good aesthetics, more appealing to users) / “easy on the eyes”</a:t>
-            </a:r>
-          </a:p>
-          <a:p>
-            <a:r>
-              <a:rPr lang="is-IS" sz="3200" dirty="0" smtClean="0"/>
-              <a:t>Exercise in Bio-Informatics </a:t>
-            </a:r>
-          </a:p>
-          <a:p>
+          <a:bodyPr/>
+          <a:lstStyle/>
+          <a:p>
+            <a:r>
+              <a:rPr lang="en-US" dirty="0" smtClean="0"/>
+              <a:t>Steve Jobs (American entrepreneur and inventor [Apple])</a:t>
+            </a:r>
+            <a:endParaRPr lang="en-US" dirty="0"/>
+          </a:p>
+        </p:txBody>
+      </p:sp>
+      <p:sp>
+        <p:nvSpPr>
+          <p:cNvPr id="4" name="Text Placeholder 3"/>
+          <p:cNvSpPr>
+            <a:spLocks noGrp="1"/>
+          </p:cNvSpPr>
+          <p:nvPr>
+            <p:ph type="body" sz="half" idx="2"/>
+          </p:nvPr>
+        </p:nvSpPr>
+        <p:spPr/>
+        <p:txBody>
+          <a:bodyPr/>
+          <a:lstStyle/>
+          <a:p>
+            <a:r>
+              <a:rPr lang="en-US" dirty="0" smtClean="0"/>
+              <a:t>Quote from Steve Jobs why design is important in our project</a:t>
+            </a:r>
             <a:endParaRPr lang="en-US" dirty="0"/>
           </a:p>
         </p:txBody>
@@ -7628,7 +7832,7 @@
     </p:spTree>
     <p:extLst>
       <p:ext uri="{BB962C8B-B14F-4D97-AF65-F5344CB8AC3E}">
-        <p14:creationId xmlns:p14="http://schemas.microsoft.com/office/powerpoint/2010/main" val="602297893"/>
+        <p14:creationId xmlns:p14="http://schemas.microsoft.com/office/powerpoint/2010/main" val="324763920"/>
       </p:ext>
     </p:extLst>
   </p:cSld>

</xml_diff>